<commit_message>
Modification de la documentation pour le rapport
</commit_message>
<xml_diff>
--- a/Documentation/Schemas_pour_rapport.pptx
+++ b/Documentation/Schemas_pour_rapport.pptx
@@ -6,6 +6,7 @@
   </p:sldMasterIdLst>
   <p:sldIdLst>
     <p:sldId id="256" r:id="rId2"/>
+    <p:sldId id="257" r:id="rId3"/>
   </p:sldIdLst>
   <p:sldSz cx="12192000" cy="6858000"/>
   <p:notesSz cx="6858000" cy="9144000"/>
@@ -104,6 +105,11 @@
       </a:defRPr>
     </a:lvl9pPr>
   </p:defaultTextStyle>
+  <p:extLst>
+    <p:ext uri="{EFAFB233-063F-42B5-8137-9DF3F51BA10A}">
+      <p15:sldGuideLst xmlns:p15="http://schemas.microsoft.com/office/powerpoint/2012/main"/>
+    </p:ext>
+  </p:extLst>
 </p:presentation>
 </file>
 
@@ -256,7 +262,7 @@
           <a:p>
             <a:fld id="{C8D7189A-1B80-4278-8BBB-32BD2856338A}" type="datetimeFigureOut">
               <a:rPr lang="fr-CH" smtClean="0"/>
-              <a:t>28.04.2022</a:t>
+              <a:t>05.05.2022</a:t>
             </a:fld>
             <a:endParaRPr lang="fr-CH"/>
           </a:p>
@@ -456,7 +462,7 @@
           <a:p>
             <a:fld id="{C8D7189A-1B80-4278-8BBB-32BD2856338A}" type="datetimeFigureOut">
               <a:rPr lang="fr-CH" smtClean="0"/>
-              <a:t>28.04.2022</a:t>
+              <a:t>05.05.2022</a:t>
             </a:fld>
             <a:endParaRPr lang="fr-CH"/>
           </a:p>
@@ -666,7 +672,7 @@
           <a:p>
             <a:fld id="{C8D7189A-1B80-4278-8BBB-32BD2856338A}" type="datetimeFigureOut">
               <a:rPr lang="fr-CH" smtClean="0"/>
-              <a:t>28.04.2022</a:t>
+              <a:t>05.05.2022</a:t>
             </a:fld>
             <a:endParaRPr lang="fr-CH"/>
           </a:p>
@@ -866,7 +872,7 @@
           <a:p>
             <a:fld id="{C8D7189A-1B80-4278-8BBB-32BD2856338A}" type="datetimeFigureOut">
               <a:rPr lang="fr-CH" smtClean="0"/>
-              <a:t>28.04.2022</a:t>
+              <a:t>05.05.2022</a:t>
             </a:fld>
             <a:endParaRPr lang="fr-CH"/>
           </a:p>
@@ -1142,7 +1148,7 @@
           <a:p>
             <a:fld id="{C8D7189A-1B80-4278-8BBB-32BD2856338A}" type="datetimeFigureOut">
               <a:rPr lang="fr-CH" smtClean="0"/>
-              <a:t>28.04.2022</a:t>
+              <a:t>05.05.2022</a:t>
             </a:fld>
             <a:endParaRPr lang="fr-CH"/>
           </a:p>
@@ -1410,7 +1416,7 @@
           <a:p>
             <a:fld id="{C8D7189A-1B80-4278-8BBB-32BD2856338A}" type="datetimeFigureOut">
               <a:rPr lang="fr-CH" smtClean="0"/>
-              <a:t>28.04.2022</a:t>
+              <a:t>05.05.2022</a:t>
             </a:fld>
             <a:endParaRPr lang="fr-CH"/>
           </a:p>
@@ -1825,7 +1831,7 @@
           <a:p>
             <a:fld id="{C8D7189A-1B80-4278-8BBB-32BD2856338A}" type="datetimeFigureOut">
               <a:rPr lang="fr-CH" smtClean="0"/>
-              <a:t>28.04.2022</a:t>
+              <a:t>05.05.2022</a:t>
             </a:fld>
             <a:endParaRPr lang="fr-CH"/>
           </a:p>
@@ -1967,7 +1973,7 @@
           <a:p>
             <a:fld id="{C8D7189A-1B80-4278-8BBB-32BD2856338A}" type="datetimeFigureOut">
               <a:rPr lang="fr-CH" smtClean="0"/>
-              <a:t>28.04.2022</a:t>
+              <a:t>05.05.2022</a:t>
             </a:fld>
             <a:endParaRPr lang="fr-CH"/>
           </a:p>
@@ -2080,7 +2086,7 @@
           <a:p>
             <a:fld id="{C8D7189A-1B80-4278-8BBB-32BD2856338A}" type="datetimeFigureOut">
               <a:rPr lang="fr-CH" smtClean="0"/>
-              <a:t>28.04.2022</a:t>
+              <a:t>05.05.2022</a:t>
             </a:fld>
             <a:endParaRPr lang="fr-CH"/>
           </a:p>
@@ -2393,7 +2399,7 @@
           <a:p>
             <a:fld id="{C8D7189A-1B80-4278-8BBB-32BD2856338A}" type="datetimeFigureOut">
               <a:rPr lang="fr-CH" smtClean="0"/>
-              <a:t>28.04.2022</a:t>
+              <a:t>05.05.2022</a:t>
             </a:fld>
             <a:endParaRPr lang="fr-CH"/>
           </a:p>
@@ -2682,7 +2688,7 @@
           <a:p>
             <a:fld id="{C8D7189A-1B80-4278-8BBB-32BD2856338A}" type="datetimeFigureOut">
               <a:rPr lang="fr-CH" smtClean="0"/>
-              <a:t>28.04.2022</a:t>
+              <a:t>05.05.2022</a:t>
             </a:fld>
             <a:endParaRPr lang="fr-CH"/>
           </a:p>
@@ -2925,7 +2931,7 @@
           <a:p>
             <a:fld id="{C8D7189A-1B80-4278-8BBB-32BD2856338A}" type="datetimeFigureOut">
               <a:rPr lang="fr-CH" smtClean="0"/>
-              <a:t>28.04.2022</a:t>
+              <a:t>05.05.2022</a:t>
             </a:fld>
             <a:endParaRPr lang="fr-CH"/>
           </a:p>
@@ -4193,6 +4199,846 @@
 </p:sld>
 </file>
 
+<file path=ppt/slides/slide2.xml><?xml version="1.0" encoding="utf-8"?>
+<p:sld xmlns:a="http://schemas.openxmlformats.org/drawingml/2006/main" xmlns:r="http://schemas.openxmlformats.org/officeDocument/2006/relationships" xmlns:p="http://schemas.openxmlformats.org/presentationml/2006/main">
+  <p:cSld>
+    <p:spTree>
+      <p:nvGrpSpPr>
+        <p:cNvPr id="1" name=""/>
+        <p:cNvGrpSpPr/>
+        <p:nvPr/>
+      </p:nvGrpSpPr>
+      <p:grpSpPr>
+        <a:xfrm>
+          <a:off x="0" y="0"/>
+          <a:ext cx="0" cy="0"/>
+          <a:chOff x="0" y="0"/>
+          <a:chExt cx="0" cy="0"/>
+        </a:xfrm>
+      </p:grpSpPr>
+      <p:sp>
+        <p:nvSpPr>
+          <p:cNvPr id="4" name="Ellipse 3">
+            <a:extLst>
+              <a:ext uri="{FF2B5EF4-FFF2-40B4-BE49-F238E27FC236}">
+                <a16:creationId xmlns:a16="http://schemas.microsoft.com/office/drawing/2014/main" id="{C006A886-BF77-41D0-A6A6-664076C3F262}"/>
+              </a:ext>
+            </a:extLst>
+          </p:cNvPr>
+          <p:cNvSpPr/>
+          <p:nvPr/>
+        </p:nvSpPr>
+        <p:spPr>
+          <a:xfrm>
+            <a:off x="4219575" y="914850"/>
+            <a:ext cx="3600000" cy="3600000"/>
+          </a:xfrm>
+          <a:prstGeom prst="ellipse">
+            <a:avLst/>
+          </a:prstGeom>
+          <a:noFill/>
+          <a:ln w="19050">
+            <a:solidFill>
+              <a:schemeClr val="tx1"/>
+            </a:solidFill>
+          </a:ln>
+        </p:spPr>
+        <p:style>
+          <a:lnRef idx="2">
+            <a:schemeClr val="accent1">
+              <a:shade val="50000"/>
+            </a:schemeClr>
+          </a:lnRef>
+          <a:fillRef idx="1">
+            <a:schemeClr val="accent1"/>
+          </a:fillRef>
+          <a:effectRef idx="0">
+            <a:schemeClr val="accent1"/>
+          </a:effectRef>
+          <a:fontRef idx="minor">
+            <a:schemeClr val="lt1"/>
+          </a:fontRef>
+        </p:style>
+        <p:txBody>
+          <a:bodyPr rtlCol="0" anchor="ctr"/>
+          <a:lstStyle/>
+          <a:p>
+            <a:pPr algn="ctr"/>
+            <a:endParaRPr lang="fr-CH"/>
+          </a:p>
+        </p:txBody>
+      </p:sp>
+      <p:sp>
+        <p:nvSpPr>
+          <p:cNvPr id="11" name="ZoneTexte 10">
+            <a:extLst>
+              <a:ext uri="{FF2B5EF4-FFF2-40B4-BE49-F238E27FC236}">
+                <a16:creationId xmlns:a16="http://schemas.microsoft.com/office/drawing/2014/main" id="{F6D48EB4-B179-4EAA-8FC5-04DC8BA942EE}"/>
+              </a:ext>
+            </a:extLst>
+          </p:cNvPr>
+          <p:cNvSpPr txBox="1"/>
+          <p:nvPr/>
+        </p:nvSpPr>
+        <p:spPr>
+          <a:xfrm>
+            <a:off x="5100412" y="2391430"/>
+            <a:ext cx="1838325" cy="523220"/>
+          </a:xfrm>
+          <a:prstGeom prst="rect">
+            <a:avLst/>
+          </a:prstGeom>
+          <a:noFill/>
+        </p:spPr>
+        <p:txBody>
+          <a:bodyPr wrap="square" rtlCol="0">
+            <a:spAutoFit/>
+          </a:bodyPr>
+          <a:lstStyle/>
+          <a:p>
+            <a:pPr algn="ctr"/>
+            <a:r>
+              <a:rPr lang="fr-CH" sz="2800" b="1" dirty="0"/>
+              <a:t>e-puck2</a:t>
+            </a:r>
+          </a:p>
+        </p:txBody>
+      </p:sp>
+      <p:cxnSp>
+        <p:nvCxnSpPr>
+          <p:cNvPr id="24" name="Connecteur droit avec flèche 23">
+            <a:extLst>
+              <a:ext uri="{FF2B5EF4-FFF2-40B4-BE49-F238E27FC236}">
+                <a16:creationId xmlns:a16="http://schemas.microsoft.com/office/drawing/2014/main" id="{C50ABEE4-20E7-4D10-98DC-D5B42E2E48D3}"/>
+              </a:ext>
+            </a:extLst>
+          </p:cNvPr>
+          <p:cNvCxnSpPr/>
+          <p:nvPr/>
+        </p:nvCxnSpPr>
+        <p:spPr>
+          <a:xfrm>
+            <a:off x="6019574" y="4902098"/>
+            <a:ext cx="0" cy="847725"/>
+          </a:xfrm>
+          <a:prstGeom prst="straightConnector1">
+            <a:avLst/>
+          </a:prstGeom>
+          <a:ln w="76200">
+            <a:solidFill>
+              <a:srgbClr val="4FEB35"/>
+            </a:solidFill>
+            <a:tailEnd type="triangle"/>
+          </a:ln>
+        </p:spPr>
+        <p:style>
+          <a:lnRef idx="1">
+            <a:schemeClr val="accent1"/>
+          </a:lnRef>
+          <a:fillRef idx="0">
+            <a:schemeClr val="accent1"/>
+          </a:fillRef>
+          <a:effectRef idx="0">
+            <a:schemeClr val="accent1"/>
+          </a:effectRef>
+          <a:fontRef idx="minor">
+            <a:schemeClr val="tx1"/>
+          </a:fontRef>
+        </p:style>
+      </p:cxnSp>
+      <p:cxnSp>
+        <p:nvCxnSpPr>
+          <p:cNvPr id="26" name="Connecteur droit avec flèche 25">
+            <a:extLst>
+              <a:ext uri="{FF2B5EF4-FFF2-40B4-BE49-F238E27FC236}">
+                <a16:creationId xmlns:a16="http://schemas.microsoft.com/office/drawing/2014/main" id="{6FEF90A1-EE19-41E2-B679-21A79313CE49}"/>
+              </a:ext>
+            </a:extLst>
+          </p:cNvPr>
+          <p:cNvCxnSpPr>
+            <a:cxnSpLocks/>
+          </p:cNvCxnSpPr>
+          <p:nvPr/>
+        </p:nvCxnSpPr>
+        <p:spPr>
+          <a:xfrm>
+            <a:off x="5999341" y="2206764"/>
+            <a:ext cx="720000" cy="0"/>
+          </a:xfrm>
+          <a:prstGeom prst="straightConnector1">
+            <a:avLst/>
+          </a:prstGeom>
+          <a:ln w="28575">
+            <a:solidFill>
+              <a:schemeClr val="tx1"/>
+            </a:solidFill>
+            <a:tailEnd type="triangle"/>
+          </a:ln>
+        </p:spPr>
+        <p:style>
+          <a:lnRef idx="1">
+            <a:schemeClr val="accent1"/>
+          </a:lnRef>
+          <a:fillRef idx="0">
+            <a:schemeClr val="accent1"/>
+          </a:fillRef>
+          <a:effectRef idx="0">
+            <a:schemeClr val="accent1"/>
+          </a:effectRef>
+          <a:fontRef idx="minor">
+            <a:schemeClr val="tx1"/>
+          </a:fontRef>
+        </p:style>
+      </p:cxnSp>
+      <p:cxnSp>
+        <p:nvCxnSpPr>
+          <p:cNvPr id="28" name="Connecteur droit avec flèche 27">
+            <a:extLst>
+              <a:ext uri="{FF2B5EF4-FFF2-40B4-BE49-F238E27FC236}">
+                <a16:creationId xmlns:a16="http://schemas.microsoft.com/office/drawing/2014/main" id="{D7A05C21-F398-4E72-A9C5-A081D0CB3A17}"/>
+              </a:ext>
+            </a:extLst>
+          </p:cNvPr>
+          <p:cNvCxnSpPr>
+            <a:cxnSpLocks/>
+          </p:cNvCxnSpPr>
+          <p:nvPr/>
+        </p:nvCxnSpPr>
+        <p:spPr>
+          <a:xfrm flipV="1">
+            <a:off x="5999341" y="1486764"/>
+            <a:ext cx="0" cy="720000"/>
+          </a:xfrm>
+          <a:prstGeom prst="straightConnector1">
+            <a:avLst/>
+          </a:prstGeom>
+          <a:ln w="28575">
+            <a:solidFill>
+              <a:schemeClr val="tx1"/>
+            </a:solidFill>
+            <a:tailEnd type="triangle"/>
+          </a:ln>
+        </p:spPr>
+        <p:style>
+          <a:lnRef idx="1">
+            <a:schemeClr val="accent1"/>
+          </a:lnRef>
+          <a:fillRef idx="0">
+            <a:schemeClr val="accent1"/>
+          </a:fillRef>
+          <a:effectRef idx="0">
+            <a:schemeClr val="accent1"/>
+          </a:effectRef>
+          <a:fontRef idx="minor">
+            <a:schemeClr val="tx1"/>
+          </a:fontRef>
+        </p:style>
+      </p:cxnSp>
+      <p:sp>
+        <p:nvSpPr>
+          <p:cNvPr id="30" name="Ellipse 29">
+            <a:extLst>
+              <a:ext uri="{FF2B5EF4-FFF2-40B4-BE49-F238E27FC236}">
+                <a16:creationId xmlns:a16="http://schemas.microsoft.com/office/drawing/2014/main" id="{5C35D229-A603-4CA8-811C-22FA843BBBC5}"/>
+              </a:ext>
+            </a:extLst>
+          </p:cNvPr>
+          <p:cNvSpPr/>
+          <p:nvPr/>
+        </p:nvSpPr>
+        <p:spPr>
+          <a:xfrm>
+            <a:off x="5949900" y="2152765"/>
+            <a:ext cx="108000" cy="108000"/>
+          </a:xfrm>
+          <a:prstGeom prst="ellipse">
+            <a:avLst/>
+          </a:prstGeom>
+          <a:noFill/>
+          <a:ln w="28575">
+            <a:solidFill>
+              <a:schemeClr val="tx1"/>
+            </a:solidFill>
+          </a:ln>
+        </p:spPr>
+        <p:style>
+          <a:lnRef idx="2">
+            <a:schemeClr val="accent1">
+              <a:shade val="50000"/>
+            </a:schemeClr>
+          </a:lnRef>
+          <a:fillRef idx="1">
+            <a:schemeClr val="accent1"/>
+          </a:fillRef>
+          <a:effectRef idx="0">
+            <a:schemeClr val="accent1"/>
+          </a:effectRef>
+          <a:fontRef idx="minor">
+            <a:schemeClr val="lt1"/>
+          </a:fontRef>
+        </p:style>
+        <p:txBody>
+          <a:bodyPr rtlCol="0" anchor="ctr"/>
+          <a:lstStyle/>
+          <a:p>
+            <a:pPr algn="ctr"/>
+            <a:endParaRPr lang="fr-CH"/>
+          </a:p>
+        </p:txBody>
+      </p:sp>
+      <p:sp>
+        <p:nvSpPr>
+          <p:cNvPr id="31" name="ZoneTexte 30">
+            <a:extLst>
+              <a:ext uri="{FF2B5EF4-FFF2-40B4-BE49-F238E27FC236}">
+                <a16:creationId xmlns:a16="http://schemas.microsoft.com/office/drawing/2014/main" id="{289BB8B5-26F8-4762-B5C4-5B84892D6F51}"/>
+              </a:ext>
+            </a:extLst>
+          </p:cNvPr>
+          <p:cNvSpPr txBox="1"/>
+          <p:nvPr/>
+        </p:nvSpPr>
+        <p:spPr>
+          <a:xfrm>
+            <a:off x="6664417" y="2022098"/>
+            <a:ext cx="274320" cy="369332"/>
+          </a:xfrm>
+          <a:prstGeom prst="rect">
+            <a:avLst/>
+          </a:prstGeom>
+          <a:noFill/>
+        </p:spPr>
+        <p:txBody>
+          <a:bodyPr wrap="square" rtlCol="0">
+            <a:spAutoFit/>
+          </a:bodyPr>
+          <a:lstStyle/>
+          <a:p>
+            <a:r>
+              <a:rPr lang="fr-CH" dirty="0"/>
+              <a:t>x</a:t>
+            </a:r>
+          </a:p>
+        </p:txBody>
+      </p:sp>
+      <p:sp>
+        <p:nvSpPr>
+          <p:cNvPr id="32" name="ZoneTexte 31">
+            <a:extLst>
+              <a:ext uri="{FF2B5EF4-FFF2-40B4-BE49-F238E27FC236}">
+                <a16:creationId xmlns:a16="http://schemas.microsoft.com/office/drawing/2014/main" id="{C6B7815E-DBCB-468E-A2E5-672A40569EA1}"/>
+              </a:ext>
+            </a:extLst>
+          </p:cNvPr>
+          <p:cNvSpPr txBox="1"/>
+          <p:nvPr/>
+        </p:nvSpPr>
+        <p:spPr>
+          <a:xfrm>
+            <a:off x="5862181" y="1117432"/>
+            <a:ext cx="274320" cy="369332"/>
+          </a:xfrm>
+          <a:prstGeom prst="rect">
+            <a:avLst/>
+          </a:prstGeom>
+          <a:noFill/>
+        </p:spPr>
+        <p:txBody>
+          <a:bodyPr wrap="square" rtlCol="0">
+            <a:spAutoFit/>
+          </a:bodyPr>
+          <a:lstStyle/>
+          <a:p>
+            <a:r>
+              <a:rPr lang="fr-CH" dirty="0"/>
+              <a:t>y</a:t>
+            </a:r>
+          </a:p>
+        </p:txBody>
+      </p:sp>
+      <p:sp>
+        <p:nvSpPr>
+          <p:cNvPr id="33" name="ZoneTexte 32">
+            <a:extLst>
+              <a:ext uri="{FF2B5EF4-FFF2-40B4-BE49-F238E27FC236}">
+                <a16:creationId xmlns:a16="http://schemas.microsoft.com/office/drawing/2014/main" id="{57CA9BAD-CBCA-4957-916B-572E7A027F8A}"/>
+              </a:ext>
+            </a:extLst>
+          </p:cNvPr>
+          <p:cNvSpPr txBox="1"/>
+          <p:nvPr/>
+        </p:nvSpPr>
+        <p:spPr>
+          <a:xfrm>
+            <a:off x="5725021" y="2006296"/>
+            <a:ext cx="274320" cy="369332"/>
+          </a:xfrm>
+          <a:prstGeom prst="rect">
+            <a:avLst/>
+          </a:prstGeom>
+          <a:noFill/>
+        </p:spPr>
+        <p:txBody>
+          <a:bodyPr wrap="square" rtlCol="0">
+            <a:spAutoFit/>
+          </a:bodyPr>
+          <a:lstStyle/>
+          <a:p>
+            <a:r>
+              <a:rPr lang="fr-CH" dirty="0"/>
+              <a:t>z</a:t>
+            </a:r>
+          </a:p>
+        </p:txBody>
+      </p:sp>
+      <p:sp>
+        <p:nvSpPr>
+          <p:cNvPr id="34" name="ZoneTexte 33">
+            <a:extLst>
+              <a:ext uri="{FF2B5EF4-FFF2-40B4-BE49-F238E27FC236}">
+                <a16:creationId xmlns:a16="http://schemas.microsoft.com/office/drawing/2014/main" id="{19210912-4146-4BEA-AA6F-5413D6A5F6B0}"/>
+              </a:ext>
+            </a:extLst>
+          </p:cNvPr>
+          <p:cNvSpPr txBox="1"/>
+          <p:nvPr/>
+        </p:nvSpPr>
+        <p:spPr>
+          <a:xfrm>
+            <a:off x="6056955" y="1756434"/>
+            <a:ext cx="608408" cy="369332"/>
+          </a:xfrm>
+          <a:prstGeom prst="rect">
+            <a:avLst/>
+          </a:prstGeom>
+          <a:noFill/>
+        </p:spPr>
+        <p:txBody>
+          <a:bodyPr wrap="square" rtlCol="0">
+            <a:spAutoFit/>
+          </a:bodyPr>
+          <a:lstStyle/>
+          <a:p>
+            <a:r>
+              <a:rPr lang="fr-CH" dirty="0"/>
+              <a:t>IMU</a:t>
+            </a:r>
+          </a:p>
+        </p:txBody>
+      </p:sp>
+      <p:cxnSp>
+        <p:nvCxnSpPr>
+          <p:cNvPr id="36" name="Connecteur droit 35">
+            <a:extLst>
+              <a:ext uri="{FF2B5EF4-FFF2-40B4-BE49-F238E27FC236}">
+                <a16:creationId xmlns:a16="http://schemas.microsoft.com/office/drawing/2014/main" id="{26E444C7-9066-4006-8F63-2AF0159A387C}"/>
+              </a:ext>
+            </a:extLst>
+          </p:cNvPr>
+          <p:cNvCxnSpPr>
+            <a:cxnSpLocks/>
+            <a:endCxn id="32" idx="0"/>
+          </p:cNvCxnSpPr>
+          <p:nvPr/>
+        </p:nvCxnSpPr>
+        <p:spPr>
+          <a:xfrm>
+            <a:off x="5999341" y="97536"/>
+            <a:ext cx="0" cy="1019896"/>
+          </a:xfrm>
+          <a:prstGeom prst="line">
+            <a:avLst/>
+          </a:prstGeom>
+          <a:ln w="19050">
+            <a:solidFill>
+              <a:schemeClr val="tx1"/>
+            </a:solidFill>
+            <a:prstDash val="dashDot"/>
+          </a:ln>
+        </p:spPr>
+        <p:style>
+          <a:lnRef idx="1">
+            <a:schemeClr val="accent1"/>
+          </a:lnRef>
+          <a:fillRef idx="0">
+            <a:schemeClr val="accent1"/>
+          </a:fillRef>
+          <a:effectRef idx="0">
+            <a:schemeClr val="accent1"/>
+          </a:effectRef>
+          <a:fontRef idx="minor">
+            <a:schemeClr val="tx1"/>
+          </a:fontRef>
+        </p:style>
+      </p:cxnSp>
+      <p:cxnSp>
+        <p:nvCxnSpPr>
+          <p:cNvPr id="37" name="Connecteur droit 36">
+            <a:extLst>
+              <a:ext uri="{FF2B5EF4-FFF2-40B4-BE49-F238E27FC236}">
+                <a16:creationId xmlns:a16="http://schemas.microsoft.com/office/drawing/2014/main" id="{65F81032-FB13-45A6-864D-A29B366CB81F}"/>
+              </a:ext>
+            </a:extLst>
+          </p:cNvPr>
+          <p:cNvCxnSpPr>
+            <a:cxnSpLocks/>
+            <a:stCxn id="11" idx="2"/>
+            <a:endCxn id="4" idx="4"/>
+          </p:cNvCxnSpPr>
+          <p:nvPr/>
+        </p:nvCxnSpPr>
+        <p:spPr>
+          <a:xfrm>
+            <a:off x="6019575" y="2914650"/>
+            <a:ext cx="0" cy="1600200"/>
+          </a:xfrm>
+          <a:prstGeom prst="line">
+            <a:avLst/>
+          </a:prstGeom>
+          <a:ln w="19050">
+            <a:solidFill>
+              <a:schemeClr val="tx1"/>
+            </a:solidFill>
+            <a:prstDash val="dashDot"/>
+          </a:ln>
+        </p:spPr>
+        <p:style>
+          <a:lnRef idx="1">
+            <a:schemeClr val="accent1"/>
+          </a:lnRef>
+          <a:fillRef idx="0">
+            <a:schemeClr val="accent1"/>
+          </a:fillRef>
+          <a:effectRef idx="0">
+            <a:schemeClr val="accent1"/>
+          </a:effectRef>
+          <a:fontRef idx="minor">
+            <a:schemeClr val="tx1"/>
+          </a:fontRef>
+        </p:style>
+      </p:cxnSp>
+      <p:sp>
+        <p:nvSpPr>
+          <p:cNvPr id="52" name="ZoneTexte 51">
+            <a:extLst>
+              <a:ext uri="{FF2B5EF4-FFF2-40B4-BE49-F238E27FC236}">
+                <a16:creationId xmlns:a16="http://schemas.microsoft.com/office/drawing/2014/main" id="{70DA03C4-3636-4356-889D-197CBA12BEC1}"/>
+              </a:ext>
+            </a:extLst>
+          </p:cNvPr>
+          <p:cNvSpPr txBox="1"/>
+          <p:nvPr/>
+        </p:nvSpPr>
+        <p:spPr>
+          <a:xfrm>
+            <a:off x="5866839" y="4532766"/>
+            <a:ext cx="380232" cy="369332"/>
+          </a:xfrm>
+          <a:prstGeom prst="rect">
+            <a:avLst/>
+          </a:prstGeom>
+          <a:noFill/>
+        </p:spPr>
+        <p:txBody>
+          <a:bodyPr wrap="none" rtlCol="0">
+            <a:spAutoFit/>
+          </a:bodyPr>
+          <a:lstStyle/>
+          <a:p>
+            <a:r>
+              <a:rPr lang="fr-CH" dirty="0"/>
+              <a:t>0°</a:t>
+            </a:r>
+          </a:p>
+        </p:txBody>
+      </p:sp>
+      <p:sp>
+        <p:nvSpPr>
+          <p:cNvPr id="53" name="ZoneTexte 52">
+            <a:extLst>
+              <a:ext uri="{FF2B5EF4-FFF2-40B4-BE49-F238E27FC236}">
+                <a16:creationId xmlns:a16="http://schemas.microsoft.com/office/drawing/2014/main" id="{C838A25D-1B41-4CCA-9AEC-92651D99598D}"/>
+              </a:ext>
+            </a:extLst>
+          </p:cNvPr>
+          <p:cNvSpPr txBox="1"/>
+          <p:nvPr/>
+        </p:nvSpPr>
+        <p:spPr>
+          <a:xfrm>
+            <a:off x="7879762" y="2468374"/>
+            <a:ext cx="624158" cy="369332"/>
+          </a:xfrm>
+          <a:prstGeom prst="rect">
+            <a:avLst/>
+          </a:prstGeom>
+          <a:noFill/>
+        </p:spPr>
+        <p:txBody>
+          <a:bodyPr wrap="square" rtlCol="0">
+            <a:spAutoFit/>
+          </a:bodyPr>
+          <a:lstStyle/>
+          <a:p>
+            <a:r>
+              <a:rPr lang="fr-CH" dirty="0"/>
+              <a:t>90°</a:t>
+            </a:r>
+          </a:p>
+        </p:txBody>
+      </p:sp>
+      <p:sp>
+        <p:nvSpPr>
+          <p:cNvPr id="54" name="ZoneTexte 53">
+            <a:extLst>
+              <a:ext uri="{FF2B5EF4-FFF2-40B4-BE49-F238E27FC236}">
+                <a16:creationId xmlns:a16="http://schemas.microsoft.com/office/drawing/2014/main" id="{3C776EDD-9F19-4190-9817-C1538E12DE2B}"/>
+              </a:ext>
+            </a:extLst>
+          </p:cNvPr>
+          <p:cNvSpPr txBox="1"/>
+          <p:nvPr/>
+        </p:nvSpPr>
+        <p:spPr>
+          <a:xfrm>
+            <a:off x="6029048" y="554476"/>
+            <a:ext cx="624158" cy="369332"/>
+          </a:xfrm>
+          <a:prstGeom prst="rect">
+            <a:avLst/>
+          </a:prstGeom>
+          <a:noFill/>
+        </p:spPr>
+        <p:txBody>
+          <a:bodyPr wrap="square" rtlCol="0">
+            <a:spAutoFit/>
+          </a:bodyPr>
+          <a:lstStyle/>
+          <a:p>
+            <a:r>
+              <a:rPr lang="fr-CH" dirty="0"/>
+              <a:t>180°</a:t>
+            </a:r>
+          </a:p>
+        </p:txBody>
+      </p:sp>
+      <p:sp>
+        <p:nvSpPr>
+          <p:cNvPr id="55" name="ZoneTexte 54">
+            <a:extLst>
+              <a:ext uri="{FF2B5EF4-FFF2-40B4-BE49-F238E27FC236}">
+                <a16:creationId xmlns:a16="http://schemas.microsoft.com/office/drawing/2014/main" id="{32FD392E-1C7F-4002-85EB-051799D06378}"/>
+              </a:ext>
+            </a:extLst>
+          </p:cNvPr>
+          <p:cNvSpPr txBox="1"/>
+          <p:nvPr/>
+        </p:nvSpPr>
+        <p:spPr>
+          <a:xfrm>
+            <a:off x="3595416" y="2468374"/>
+            <a:ext cx="624158" cy="369332"/>
+          </a:xfrm>
+          <a:prstGeom prst="rect">
+            <a:avLst/>
+          </a:prstGeom>
+          <a:noFill/>
+        </p:spPr>
+        <p:txBody>
+          <a:bodyPr wrap="square" rtlCol="0">
+            <a:spAutoFit/>
+          </a:bodyPr>
+          <a:lstStyle/>
+          <a:p>
+            <a:r>
+              <a:rPr lang="fr-CH" dirty="0"/>
+              <a:t>- 90°</a:t>
+            </a:r>
+          </a:p>
+        </p:txBody>
+      </p:sp>
+      <p:sp>
+        <p:nvSpPr>
+          <p:cNvPr id="56" name="ZoneTexte 55">
+            <a:extLst>
+              <a:ext uri="{FF2B5EF4-FFF2-40B4-BE49-F238E27FC236}">
+                <a16:creationId xmlns:a16="http://schemas.microsoft.com/office/drawing/2014/main" id="{51D79734-D6D7-404E-B9EE-62403FB0065E}"/>
+              </a:ext>
+            </a:extLst>
+          </p:cNvPr>
+          <p:cNvSpPr txBox="1"/>
+          <p:nvPr/>
+        </p:nvSpPr>
+        <p:spPr>
+          <a:xfrm>
+            <a:off x="5326380" y="563435"/>
+            <a:ext cx="776467" cy="369332"/>
+          </a:xfrm>
+          <a:prstGeom prst="rect">
+            <a:avLst/>
+          </a:prstGeom>
+          <a:noFill/>
+        </p:spPr>
+        <p:txBody>
+          <a:bodyPr wrap="square" rtlCol="0">
+            <a:spAutoFit/>
+          </a:bodyPr>
+          <a:lstStyle/>
+          <a:p>
+            <a:r>
+              <a:rPr lang="fr-CH" dirty="0"/>
+              <a:t>-180°</a:t>
+            </a:r>
+          </a:p>
+        </p:txBody>
+      </p:sp>
+      <p:sp>
+        <p:nvSpPr>
+          <p:cNvPr id="69" name="Arc 68">
+            <a:extLst>
+              <a:ext uri="{FF2B5EF4-FFF2-40B4-BE49-F238E27FC236}">
+                <a16:creationId xmlns:a16="http://schemas.microsoft.com/office/drawing/2014/main" id="{2F6EEBE1-3E5D-40A9-9BD0-AF6DEF48D299}"/>
+              </a:ext>
+            </a:extLst>
+          </p:cNvPr>
+          <p:cNvSpPr/>
+          <p:nvPr/>
+        </p:nvSpPr>
+        <p:spPr>
+          <a:xfrm rot="5400000">
+            <a:off x="4323274" y="1105708"/>
+            <a:ext cx="3392599" cy="4190543"/>
+          </a:xfrm>
+          <a:prstGeom prst="arc">
+            <a:avLst>
+              <a:gd name="adj1" fmla="val 19227480"/>
+              <a:gd name="adj2" fmla="val 2448288"/>
+            </a:avLst>
+          </a:prstGeom>
+          <a:ln w="19050" cap="flat" cmpd="sng" algn="ctr">
+            <a:solidFill>
+              <a:schemeClr val="dk1"/>
+            </a:solidFill>
+            <a:prstDash val="solid"/>
+            <a:round/>
+            <a:headEnd type="arrow" w="med" len="med"/>
+            <a:tailEnd type="arrow" w="med" len="med"/>
+          </a:ln>
+        </p:spPr>
+        <p:style>
+          <a:lnRef idx="0">
+            <a:scrgbClr r="0" g="0" b="0"/>
+          </a:lnRef>
+          <a:fillRef idx="0">
+            <a:scrgbClr r="0" g="0" b="0"/>
+          </a:fillRef>
+          <a:effectRef idx="0">
+            <a:scrgbClr r="0" g="0" b="0"/>
+          </a:effectRef>
+          <a:fontRef idx="minor">
+            <a:schemeClr val="tx1"/>
+          </a:fontRef>
+        </p:style>
+        <p:txBody>
+          <a:bodyPr rtlCol="0" anchor="ctr"/>
+          <a:lstStyle/>
+          <a:p>
+            <a:pPr algn="ctr"/>
+            <a:endParaRPr lang="fr-CH"/>
+          </a:p>
+        </p:txBody>
+      </p:sp>
+      <p:sp>
+        <p:nvSpPr>
+          <p:cNvPr id="70" name="ZoneTexte 69">
+            <a:extLst>
+              <a:ext uri="{FF2B5EF4-FFF2-40B4-BE49-F238E27FC236}">
+                <a16:creationId xmlns:a16="http://schemas.microsoft.com/office/drawing/2014/main" id="{E5BA11F6-3AB6-4A25-9389-5DCC02C5DB9B}"/>
+              </a:ext>
+            </a:extLst>
+          </p:cNvPr>
+          <p:cNvSpPr txBox="1"/>
+          <p:nvPr/>
+        </p:nvSpPr>
+        <p:spPr>
+          <a:xfrm>
+            <a:off x="6154554" y="4920014"/>
+            <a:ext cx="675185" cy="369332"/>
+          </a:xfrm>
+          <a:prstGeom prst="rect">
+            <a:avLst/>
+          </a:prstGeom>
+          <a:noFill/>
+        </p:spPr>
+        <p:txBody>
+          <a:bodyPr wrap="none" rtlCol="0">
+            <a:spAutoFit/>
+          </a:bodyPr>
+          <a:lstStyle/>
+          <a:p>
+            <a:r>
+              <a:rPr lang="el-GR" dirty="0"/>
+              <a:t>Θ</a:t>
+            </a:r>
+            <a:r>
+              <a:rPr lang="fr-CH" dirty="0"/>
+              <a:t> &gt; 0</a:t>
+            </a:r>
+          </a:p>
+        </p:txBody>
+      </p:sp>
+      <p:sp>
+        <p:nvSpPr>
+          <p:cNvPr id="71" name="ZoneTexte 70">
+            <a:extLst>
+              <a:ext uri="{FF2B5EF4-FFF2-40B4-BE49-F238E27FC236}">
+                <a16:creationId xmlns:a16="http://schemas.microsoft.com/office/drawing/2014/main" id="{9045422C-7553-4AB6-84A8-93A7BC53AF10}"/>
+              </a:ext>
+            </a:extLst>
+          </p:cNvPr>
+          <p:cNvSpPr txBox="1"/>
+          <p:nvPr/>
+        </p:nvSpPr>
+        <p:spPr>
+          <a:xfrm>
+            <a:off x="5209410" y="4911056"/>
+            <a:ext cx="675185" cy="369332"/>
+          </a:xfrm>
+          <a:prstGeom prst="rect">
+            <a:avLst/>
+          </a:prstGeom>
+          <a:noFill/>
+        </p:spPr>
+        <p:txBody>
+          <a:bodyPr wrap="none" rtlCol="0">
+            <a:spAutoFit/>
+          </a:bodyPr>
+          <a:lstStyle/>
+          <a:p>
+            <a:r>
+              <a:rPr lang="el-GR" dirty="0"/>
+              <a:t>Θ</a:t>
+            </a:r>
+            <a:r>
+              <a:rPr lang="fr-CH" dirty="0"/>
+              <a:t> &lt; 0</a:t>
+            </a:r>
+          </a:p>
+        </p:txBody>
+      </p:sp>
+    </p:spTree>
+    <p:extLst>
+      <p:ext uri="{BB962C8B-B14F-4D97-AF65-F5344CB8AC3E}">
+        <p14:creationId xmlns:p14="http://schemas.microsoft.com/office/powerpoint/2010/main" val="145969066"/>
+      </p:ext>
+    </p:extLst>
+  </p:cSld>
+  <p:clrMapOvr>
+    <a:masterClrMapping/>
+  </p:clrMapOvr>
+</p:sld>
+</file>
+
 <file path=ppt/theme/theme1.xml><?xml version="1.0" encoding="utf-8"?>
 <a:theme xmlns:a="http://schemas.openxmlformats.org/drawingml/2006/main" name="Thème Office">
   <a:themeElements>

</xml_diff>